<commit_message>
work on paper section
</commit_message>
<xml_diff>
--- a/JournalPaper/Diagrams/Compressor Classification.pptx
+++ b/JournalPaper/Diagrams/Compressor Classification.pptx
@@ -892,6 +892,8 @@
               <a:solidFill>
                 <a:schemeClr val="tx1"/>
               </a:solidFill>
+              <a:latin typeface="Times New Roman" panose="02020603050405020304" pitchFamily="18" charset="0"/>
+              <a:cs typeface="Times New Roman" panose="02020603050405020304" pitchFamily="18" charset="0"/>
             </a:rPr>
             <a:t>Compressors</a:t>
           </a:r>
@@ -899,6 +901,8 @@
             <a:solidFill>
               <a:schemeClr val="tx1"/>
             </a:solidFill>
+            <a:latin typeface="Times New Roman" panose="02020603050405020304" pitchFamily="18" charset="0"/>
+            <a:cs typeface="Times New Roman" panose="02020603050405020304" pitchFamily="18" charset="0"/>
           </a:endParaRPr>
         </a:p>
       </dgm:t>
@@ -910,7 +914,10 @@
         <a:bodyPr/>
         <a:lstStyle/>
         <a:p>
-          <a:endParaRPr lang="en-GB"/>
+          <a:endParaRPr lang="en-GB">
+            <a:latin typeface="Times New Roman" panose="02020603050405020304" pitchFamily="18" charset="0"/>
+            <a:cs typeface="Times New Roman" panose="02020603050405020304" pitchFamily="18" charset="0"/>
+          </a:endParaRPr>
         </a:p>
       </dgm:t>
     </dgm:pt>
@@ -921,7 +928,10 @@
         <a:bodyPr/>
         <a:lstStyle/>
         <a:p>
-          <a:endParaRPr lang="en-GB"/>
+          <a:endParaRPr lang="en-GB">
+            <a:latin typeface="Times New Roman" panose="02020603050405020304" pitchFamily="18" charset="0"/>
+            <a:cs typeface="Times New Roman" panose="02020603050405020304" pitchFamily="18" charset="0"/>
+          </a:endParaRPr>
         </a:p>
       </dgm:t>
     </dgm:pt>
@@ -944,6 +954,8 @@
               <a:solidFill>
                 <a:schemeClr val="tx1"/>
               </a:solidFill>
+              <a:latin typeface="Times New Roman" panose="02020603050405020304" pitchFamily="18" charset="0"/>
+              <a:cs typeface="Times New Roman" panose="02020603050405020304" pitchFamily="18" charset="0"/>
             </a:rPr>
             <a:t>Positive Displacement</a:t>
           </a:r>
@@ -951,6 +963,8 @@
             <a:solidFill>
               <a:schemeClr val="tx1"/>
             </a:solidFill>
+            <a:latin typeface="Times New Roman" panose="02020603050405020304" pitchFamily="18" charset="0"/>
+            <a:cs typeface="Times New Roman" panose="02020603050405020304" pitchFamily="18" charset="0"/>
           </a:endParaRPr>
         </a:p>
       </dgm:t>
@@ -973,6 +987,8 @@
             <a:solidFill>
               <a:schemeClr val="tx1"/>
             </a:solidFill>
+            <a:latin typeface="Times New Roman" panose="02020603050405020304" pitchFamily="18" charset="0"/>
+            <a:cs typeface="Times New Roman" panose="02020603050405020304" pitchFamily="18" charset="0"/>
           </a:endParaRPr>
         </a:p>
       </dgm:t>
@@ -984,7 +1000,10 @@
         <a:bodyPr/>
         <a:lstStyle/>
         <a:p>
-          <a:endParaRPr lang="en-GB"/>
+          <a:endParaRPr lang="en-GB">
+            <a:latin typeface="Times New Roman" panose="02020603050405020304" pitchFamily="18" charset="0"/>
+            <a:cs typeface="Times New Roman" panose="02020603050405020304" pitchFamily="18" charset="0"/>
+          </a:endParaRPr>
         </a:p>
       </dgm:t>
     </dgm:pt>
@@ -1007,6 +1026,8 @@
               <a:solidFill>
                 <a:schemeClr val="tx1"/>
               </a:solidFill>
+              <a:latin typeface="Times New Roman" panose="02020603050405020304" pitchFamily="18" charset="0"/>
+              <a:cs typeface="Times New Roman" panose="02020603050405020304" pitchFamily="18" charset="0"/>
             </a:rPr>
             <a:t>Aerodynamic</a:t>
           </a:r>
@@ -1014,6 +1035,8 @@
             <a:solidFill>
               <a:schemeClr val="tx1"/>
             </a:solidFill>
+            <a:latin typeface="Times New Roman" panose="02020603050405020304" pitchFamily="18" charset="0"/>
+            <a:cs typeface="Times New Roman" panose="02020603050405020304" pitchFamily="18" charset="0"/>
           </a:endParaRPr>
         </a:p>
       </dgm:t>
@@ -1036,6 +1059,8 @@
             <a:solidFill>
               <a:schemeClr val="tx1"/>
             </a:solidFill>
+            <a:latin typeface="Times New Roman" panose="02020603050405020304" pitchFamily="18" charset="0"/>
+            <a:cs typeface="Times New Roman" panose="02020603050405020304" pitchFamily="18" charset="0"/>
           </a:endParaRPr>
         </a:p>
       </dgm:t>
@@ -1047,7 +1072,10 @@
         <a:bodyPr/>
         <a:lstStyle/>
         <a:p>
-          <a:endParaRPr lang="en-GB"/>
+          <a:endParaRPr lang="en-GB">
+            <a:latin typeface="Times New Roman" panose="02020603050405020304" pitchFamily="18" charset="0"/>
+            <a:cs typeface="Times New Roman" panose="02020603050405020304" pitchFamily="18" charset="0"/>
+          </a:endParaRPr>
         </a:p>
       </dgm:t>
     </dgm:pt>
@@ -1070,6 +1098,8 @@
               <a:solidFill>
                 <a:schemeClr val="tx1"/>
               </a:solidFill>
+              <a:latin typeface="Times New Roman" panose="02020603050405020304" pitchFamily="18" charset="0"/>
+              <a:cs typeface="Times New Roman" panose="02020603050405020304" pitchFamily="18" charset="0"/>
             </a:rPr>
             <a:t>Reciprocating</a:t>
           </a:r>
@@ -1077,6 +1107,8 @@
             <a:solidFill>
               <a:schemeClr val="tx1"/>
             </a:solidFill>
+            <a:latin typeface="Times New Roman" panose="02020603050405020304" pitchFamily="18" charset="0"/>
+            <a:cs typeface="Times New Roman" panose="02020603050405020304" pitchFamily="18" charset="0"/>
           </a:endParaRPr>
         </a:p>
       </dgm:t>
@@ -1099,6 +1131,8 @@
             <a:solidFill>
               <a:schemeClr val="tx1"/>
             </a:solidFill>
+            <a:latin typeface="Times New Roman" panose="02020603050405020304" pitchFamily="18" charset="0"/>
+            <a:cs typeface="Times New Roman" panose="02020603050405020304" pitchFamily="18" charset="0"/>
           </a:endParaRPr>
         </a:p>
       </dgm:t>
@@ -1110,7 +1144,10 @@
         <a:bodyPr/>
         <a:lstStyle/>
         <a:p>
-          <a:endParaRPr lang="en-GB"/>
+          <a:endParaRPr lang="en-GB">
+            <a:latin typeface="Times New Roman" panose="02020603050405020304" pitchFamily="18" charset="0"/>
+            <a:cs typeface="Times New Roman" panose="02020603050405020304" pitchFamily="18" charset="0"/>
+          </a:endParaRPr>
         </a:p>
       </dgm:t>
     </dgm:pt>
@@ -1133,6 +1170,8 @@
               <a:solidFill>
                 <a:schemeClr val="tx1"/>
               </a:solidFill>
+              <a:latin typeface="Times New Roman" panose="02020603050405020304" pitchFamily="18" charset="0"/>
+              <a:cs typeface="Times New Roman" panose="02020603050405020304" pitchFamily="18" charset="0"/>
             </a:rPr>
             <a:t>Rotary</a:t>
           </a:r>
@@ -1140,6 +1179,8 @@
             <a:solidFill>
               <a:schemeClr val="tx1"/>
             </a:solidFill>
+            <a:latin typeface="Times New Roman" panose="02020603050405020304" pitchFamily="18" charset="0"/>
+            <a:cs typeface="Times New Roman" panose="02020603050405020304" pitchFamily="18" charset="0"/>
           </a:endParaRPr>
         </a:p>
       </dgm:t>
@@ -1162,6 +1203,8 @@
             <a:solidFill>
               <a:schemeClr val="tx1"/>
             </a:solidFill>
+            <a:latin typeface="Times New Roman" panose="02020603050405020304" pitchFamily="18" charset="0"/>
+            <a:cs typeface="Times New Roman" panose="02020603050405020304" pitchFamily="18" charset="0"/>
           </a:endParaRPr>
         </a:p>
       </dgm:t>
@@ -1173,7 +1216,10 @@
         <a:bodyPr/>
         <a:lstStyle/>
         <a:p>
-          <a:endParaRPr lang="en-GB"/>
+          <a:endParaRPr lang="en-GB">
+            <a:latin typeface="Times New Roman" panose="02020603050405020304" pitchFamily="18" charset="0"/>
+            <a:cs typeface="Times New Roman" panose="02020603050405020304" pitchFamily="18" charset="0"/>
+          </a:endParaRPr>
         </a:p>
       </dgm:t>
     </dgm:pt>
@@ -1196,6 +1242,8 @@
               <a:solidFill>
                 <a:schemeClr val="tx1"/>
               </a:solidFill>
+              <a:latin typeface="Times New Roman" panose="02020603050405020304" pitchFamily="18" charset="0"/>
+              <a:cs typeface="Times New Roman" panose="02020603050405020304" pitchFamily="18" charset="0"/>
             </a:rPr>
             <a:t>Piston</a:t>
           </a:r>
@@ -1203,6 +1251,8 @@
             <a:solidFill>
               <a:schemeClr val="tx1"/>
             </a:solidFill>
+            <a:latin typeface="Times New Roman" panose="02020603050405020304" pitchFamily="18" charset="0"/>
+            <a:cs typeface="Times New Roman" panose="02020603050405020304" pitchFamily="18" charset="0"/>
           </a:endParaRPr>
         </a:p>
       </dgm:t>
@@ -1225,6 +1275,8 @@
             <a:solidFill>
               <a:schemeClr val="tx1"/>
             </a:solidFill>
+            <a:latin typeface="Times New Roman" panose="02020603050405020304" pitchFamily="18" charset="0"/>
+            <a:cs typeface="Times New Roman" panose="02020603050405020304" pitchFamily="18" charset="0"/>
           </a:endParaRPr>
         </a:p>
       </dgm:t>
@@ -1236,7 +1288,10 @@
         <a:bodyPr/>
         <a:lstStyle/>
         <a:p>
-          <a:endParaRPr lang="en-GB"/>
+          <a:endParaRPr lang="en-GB">
+            <a:latin typeface="Times New Roman" panose="02020603050405020304" pitchFamily="18" charset="0"/>
+            <a:cs typeface="Times New Roman" panose="02020603050405020304" pitchFamily="18" charset="0"/>
+          </a:endParaRPr>
         </a:p>
       </dgm:t>
     </dgm:pt>
@@ -1259,6 +1314,8 @@
               <a:solidFill>
                 <a:schemeClr val="tx1"/>
               </a:solidFill>
+              <a:latin typeface="Times New Roman" panose="02020603050405020304" pitchFamily="18" charset="0"/>
+              <a:cs typeface="Times New Roman" panose="02020603050405020304" pitchFamily="18" charset="0"/>
             </a:rPr>
             <a:t>Diaphragm</a:t>
           </a:r>
@@ -1266,6 +1323,8 @@
             <a:solidFill>
               <a:schemeClr val="tx1"/>
             </a:solidFill>
+            <a:latin typeface="Times New Roman" panose="02020603050405020304" pitchFamily="18" charset="0"/>
+            <a:cs typeface="Times New Roman" panose="02020603050405020304" pitchFamily="18" charset="0"/>
           </a:endParaRPr>
         </a:p>
       </dgm:t>
@@ -1288,6 +1347,8 @@
             <a:solidFill>
               <a:schemeClr val="tx1"/>
             </a:solidFill>
+            <a:latin typeface="Times New Roman" panose="02020603050405020304" pitchFamily="18" charset="0"/>
+            <a:cs typeface="Times New Roman" panose="02020603050405020304" pitchFamily="18" charset="0"/>
           </a:endParaRPr>
         </a:p>
       </dgm:t>
@@ -1299,7 +1360,10 @@
         <a:bodyPr/>
         <a:lstStyle/>
         <a:p>
-          <a:endParaRPr lang="en-GB"/>
+          <a:endParaRPr lang="en-GB">
+            <a:latin typeface="Times New Roman" panose="02020603050405020304" pitchFamily="18" charset="0"/>
+            <a:cs typeface="Times New Roman" panose="02020603050405020304" pitchFamily="18" charset="0"/>
+          </a:endParaRPr>
         </a:p>
       </dgm:t>
     </dgm:pt>
@@ -1322,6 +1386,8 @@
               <a:solidFill>
                 <a:schemeClr val="tx1"/>
               </a:solidFill>
+              <a:latin typeface="Times New Roman" panose="02020603050405020304" pitchFamily="18" charset="0"/>
+              <a:cs typeface="Times New Roman" panose="02020603050405020304" pitchFamily="18" charset="0"/>
             </a:rPr>
             <a:t>One Shaft</a:t>
           </a:r>
@@ -1329,6 +1395,8 @@
             <a:solidFill>
               <a:schemeClr val="tx1"/>
             </a:solidFill>
+            <a:latin typeface="Times New Roman" panose="02020603050405020304" pitchFamily="18" charset="0"/>
+            <a:cs typeface="Times New Roman" panose="02020603050405020304" pitchFamily="18" charset="0"/>
           </a:endParaRPr>
         </a:p>
       </dgm:t>
@@ -1351,6 +1419,8 @@
             <a:solidFill>
               <a:schemeClr val="tx1"/>
             </a:solidFill>
+            <a:latin typeface="Times New Roman" panose="02020603050405020304" pitchFamily="18" charset="0"/>
+            <a:cs typeface="Times New Roman" panose="02020603050405020304" pitchFamily="18" charset="0"/>
           </a:endParaRPr>
         </a:p>
       </dgm:t>
@@ -1362,7 +1432,10 @@
         <a:bodyPr/>
         <a:lstStyle/>
         <a:p>
-          <a:endParaRPr lang="en-GB"/>
+          <a:endParaRPr lang="en-GB">
+            <a:latin typeface="Times New Roman" panose="02020603050405020304" pitchFamily="18" charset="0"/>
+            <a:cs typeface="Times New Roman" panose="02020603050405020304" pitchFamily="18" charset="0"/>
+          </a:endParaRPr>
         </a:p>
       </dgm:t>
     </dgm:pt>
@@ -1385,6 +1458,8 @@
               <a:solidFill>
                 <a:schemeClr val="tx1"/>
               </a:solidFill>
+              <a:latin typeface="Times New Roman" panose="02020603050405020304" pitchFamily="18" charset="0"/>
+              <a:cs typeface="Times New Roman" panose="02020603050405020304" pitchFamily="18" charset="0"/>
             </a:rPr>
             <a:t>Two Shaft</a:t>
           </a:r>
@@ -1392,6 +1467,8 @@
             <a:solidFill>
               <a:schemeClr val="tx1"/>
             </a:solidFill>
+            <a:latin typeface="Times New Roman" panose="02020603050405020304" pitchFamily="18" charset="0"/>
+            <a:cs typeface="Times New Roman" panose="02020603050405020304" pitchFamily="18" charset="0"/>
           </a:endParaRPr>
         </a:p>
       </dgm:t>
@@ -1414,6 +1491,8 @@
             <a:solidFill>
               <a:schemeClr val="tx1"/>
             </a:solidFill>
+            <a:latin typeface="Times New Roman" panose="02020603050405020304" pitchFamily="18" charset="0"/>
+            <a:cs typeface="Times New Roman" panose="02020603050405020304" pitchFamily="18" charset="0"/>
           </a:endParaRPr>
         </a:p>
       </dgm:t>
@@ -1425,7 +1504,10 @@
         <a:bodyPr/>
         <a:lstStyle/>
         <a:p>
-          <a:endParaRPr lang="en-GB"/>
+          <a:endParaRPr lang="en-GB">
+            <a:latin typeface="Times New Roman" panose="02020603050405020304" pitchFamily="18" charset="0"/>
+            <a:cs typeface="Times New Roman" panose="02020603050405020304" pitchFamily="18" charset="0"/>
+          </a:endParaRPr>
         </a:p>
       </dgm:t>
     </dgm:pt>
@@ -1448,6 +1530,8 @@
               <a:solidFill>
                 <a:schemeClr val="tx1"/>
               </a:solidFill>
+              <a:latin typeface="Times New Roman" panose="02020603050405020304" pitchFamily="18" charset="0"/>
+              <a:cs typeface="Times New Roman" panose="02020603050405020304" pitchFamily="18" charset="0"/>
             </a:rPr>
             <a:t>Three Shaft</a:t>
           </a:r>
@@ -1455,6 +1539,8 @@
             <a:solidFill>
               <a:schemeClr val="tx1"/>
             </a:solidFill>
+            <a:latin typeface="Times New Roman" panose="02020603050405020304" pitchFamily="18" charset="0"/>
+            <a:cs typeface="Times New Roman" panose="02020603050405020304" pitchFamily="18" charset="0"/>
           </a:endParaRPr>
         </a:p>
       </dgm:t>
@@ -1477,6 +1563,8 @@
             <a:solidFill>
               <a:schemeClr val="tx1"/>
             </a:solidFill>
+            <a:latin typeface="Times New Roman" panose="02020603050405020304" pitchFamily="18" charset="0"/>
+            <a:cs typeface="Times New Roman" panose="02020603050405020304" pitchFamily="18" charset="0"/>
           </a:endParaRPr>
         </a:p>
       </dgm:t>
@@ -1488,7 +1576,10 @@
         <a:bodyPr/>
         <a:lstStyle/>
         <a:p>
-          <a:endParaRPr lang="en-GB"/>
+          <a:endParaRPr lang="en-GB">
+            <a:latin typeface="Times New Roman" panose="02020603050405020304" pitchFamily="18" charset="0"/>
+            <a:cs typeface="Times New Roman" panose="02020603050405020304" pitchFamily="18" charset="0"/>
+          </a:endParaRPr>
         </a:p>
       </dgm:t>
     </dgm:pt>
@@ -1511,6 +1602,8 @@
               <a:solidFill>
                 <a:schemeClr val="tx1"/>
               </a:solidFill>
+              <a:latin typeface="Times New Roman" panose="02020603050405020304" pitchFamily="18" charset="0"/>
+              <a:cs typeface="Times New Roman" panose="02020603050405020304" pitchFamily="18" charset="0"/>
             </a:rPr>
             <a:t>Sliding Vane</a:t>
           </a:r>
@@ -1518,6 +1611,8 @@
             <a:solidFill>
               <a:schemeClr val="tx1"/>
             </a:solidFill>
+            <a:latin typeface="Times New Roman" panose="02020603050405020304" pitchFamily="18" charset="0"/>
+            <a:cs typeface="Times New Roman" panose="02020603050405020304" pitchFamily="18" charset="0"/>
           </a:endParaRPr>
         </a:p>
       </dgm:t>
@@ -1540,6 +1635,8 @@
             <a:solidFill>
               <a:schemeClr val="tx1"/>
             </a:solidFill>
+            <a:latin typeface="Times New Roman" panose="02020603050405020304" pitchFamily="18" charset="0"/>
+            <a:cs typeface="Times New Roman" panose="02020603050405020304" pitchFamily="18" charset="0"/>
           </a:endParaRPr>
         </a:p>
       </dgm:t>
@@ -1551,7 +1648,10 @@
         <a:bodyPr/>
         <a:lstStyle/>
         <a:p>
-          <a:endParaRPr lang="en-GB"/>
+          <a:endParaRPr lang="en-GB">
+            <a:latin typeface="Times New Roman" panose="02020603050405020304" pitchFamily="18" charset="0"/>
+            <a:cs typeface="Times New Roman" panose="02020603050405020304" pitchFamily="18" charset="0"/>
+          </a:endParaRPr>
         </a:p>
       </dgm:t>
     </dgm:pt>
@@ -1574,6 +1674,8 @@
               <a:solidFill>
                 <a:schemeClr val="tx1"/>
               </a:solidFill>
+              <a:latin typeface="Times New Roman" panose="02020603050405020304" pitchFamily="18" charset="0"/>
+              <a:cs typeface="Times New Roman" panose="02020603050405020304" pitchFamily="18" charset="0"/>
             </a:rPr>
             <a:t>Liquid Ring</a:t>
           </a:r>
@@ -1581,6 +1683,8 @@
             <a:solidFill>
               <a:schemeClr val="tx1"/>
             </a:solidFill>
+            <a:latin typeface="Times New Roman" panose="02020603050405020304" pitchFamily="18" charset="0"/>
+            <a:cs typeface="Times New Roman" panose="02020603050405020304" pitchFamily="18" charset="0"/>
           </a:endParaRPr>
         </a:p>
       </dgm:t>
@@ -1603,6 +1707,8 @@
             <a:solidFill>
               <a:schemeClr val="tx1"/>
             </a:solidFill>
+            <a:latin typeface="Times New Roman" panose="02020603050405020304" pitchFamily="18" charset="0"/>
+            <a:cs typeface="Times New Roman" panose="02020603050405020304" pitchFamily="18" charset="0"/>
           </a:endParaRPr>
         </a:p>
       </dgm:t>
@@ -1614,7 +1720,10 @@
         <a:bodyPr/>
         <a:lstStyle/>
         <a:p>
-          <a:endParaRPr lang="en-GB"/>
+          <a:endParaRPr lang="en-GB">
+            <a:latin typeface="Times New Roman" panose="02020603050405020304" pitchFamily="18" charset="0"/>
+            <a:cs typeface="Times New Roman" panose="02020603050405020304" pitchFamily="18" charset="0"/>
+          </a:endParaRPr>
         </a:p>
       </dgm:t>
     </dgm:pt>
@@ -1637,6 +1746,8 @@
               <a:solidFill>
                 <a:schemeClr val="tx1"/>
               </a:solidFill>
+              <a:latin typeface="Times New Roman" panose="02020603050405020304" pitchFamily="18" charset="0"/>
+              <a:cs typeface="Times New Roman" panose="02020603050405020304" pitchFamily="18" charset="0"/>
             </a:rPr>
             <a:t>Scroll</a:t>
           </a:r>
@@ -1644,6 +1755,8 @@
             <a:solidFill>
               <a:schemeClr val="tx1"/>
             </a:solidFill>
+            <a:latin typeface="Times New Roman" panose="02020603050405020304" pitchFamily="18" charset="0"/>
+            <a:cs typeface="Times New Roman" panose="02020603050405020304" pitchFamily="18" charset="0"/>
           </a:endParaRPr>
         </a:p>
       </dgm:t>
@@ -1666,6 +1779,8 @@
             <a:solidFill>
               <a:schemeClr val="tx1"/>
             </a:solidFill>
+            <a:latin typeface="Times New Roman" panose="02020603050405020304" pitchFamily="18" charset="0"/>
+            <a:cs typeface="Times New Roman" panose="02020603050405020304" pitchFamily="18" charset="0"/>
           </a:endParaRPr>
         </a:p>
       </dgm:t>
@@ -1677,7 +1792,10 @@
         <a:bodyPr/>
         <a:lstStyle/>
         <a:p>
-          <a:endParaRPr lang="en-GB"/>
+          <a:endParaRPr lang="en-GB">
+            <a:latin typeface="Times New Roman" panose="02020603050405020304" pitchFamily="18" charset="0"/>
+            <a:cs typeface="Times New Roman" panose="02020603050405020304" pitchFamily="18" charset="0"/>
+          </a:endParaRPr>
         </a:p>
       </dgm:t>
     </dgm:pt>
@@ -1700,6 +1818,8 @@
               <a:solidFill>
                 <a:schemeClr val="tx1"/>
               </a:solidFill>
+              <a:latin typeface="Times New Roman" panose="02020603050405020304" pitchFamily="18" charset="0"/>
+              <a:cs typeface="Times New Roman" panose="02020603050405020304" pitchFamily="18" charset="0"/>
             </a:rPr>
             <a:t>Roots</a:t>
           </a:r>
@@ -1707,6 +1827,8 @@
             <a:solidFill>
               <a:schemeClr val="tx1"/>
             </a:solidFill>
+            <a:latin typeface="Times New Roman" panose="02020603050405020304" pitchFamily="18" charset="0"/>
+            <a:cs typeface="Times New Roman" panose="02020603050405020304" pitchFamily="18" charset="0"/>
           </a:endParaRPr>
         </a:p>
       </dgm:t>
@@ -1729,6 +1851,8 @@
             <a:solidFill>
               <a:schemeClr val="tx1"/>
             </a:solidFill>
+            <a:latin typeface="Times New Roman" panose="02020603050405020304" pitchFamily="18" charset="0"/>
+            <a:cs typeface="Times New Roman" panose="02020603050405020304" pitchFamily="18" charset="0"/>
           </a:endParaRPr>
         </a:p>
       </dgm:t>
@@ -1740,7 +1864,10 @@
         <a:bodyPr/>
         <a:lstStyle/>
         <a:p>
-          <a:endParaRPr lang="en-GB"/>
+          <a:endParaRPr lang="en-GB">
+            <a:latin typeface="Times New Roman" panose="02020603050405020304" pitchFamily="18" charset="0"/>
+            <a:cs typeface="Times New Roman" panose="02020603050405020304" pitchFamily="18" charset="0"/>
+          </a:endParaRPr>
         </a:p>
       </dgm:t>
     </dgm:pt>
@@ -1763,6 +1890,8 @@
               <a:solidFill>
                 <a:schemeClr val="tx1"/>
               </a:solidFill>
+              <a:latin typeface="Times New Roman" panose="02020603050405020304" pitchFamily="18" charset="0"/>
+              <a:cs typeface="Times New Roman" panose="02020603050405020304" pitchFamily="18" charset="0"/>
             </a:rPr>
             <a:t>Twin Screw</a:t>
           </a:r>
@@ -1770,6 +1899,8 @@
             <a:solidFill>
               <a:schemeClr val="tx1"/>
             </a:solidFill>
+            <a:latin typeface="Times New Roman" panose="02020603050405020304" pitchFamily="18" charset="0"/>
+            <a:cs typeface="Times New Roman" panose="02020603050405020304" pitchFamily="18" charset="0"/>
           </a:endParaRPr>
         </a:p>
       </dgm:t>
@@ -1792,6 +1923,8 @@
             <a:solidFill>
               <a:schemeClr val="tx1"/>
             </a:solidFill>
+            <a:latin typeface="Times New Roman" panose="02020603050405020304" pitchFamily="18" charset="0"/>
+            <a:cs typeface="Times New Roman" panose="02020603050405020304" pitchFamily="18" charset="0"/>
           </a:endParaRPr>
         </a:p>
       </dgm:t>
@@ -1803,7 +1936,10 @@
         <a:bodyPr/>
         <a:lstStyle/>
         <a:p>
-          <a:endParaRPr lang="en-GB"/>
+          <a:endParaRPr lang="en-GB">
+            <a:latin typeface="Times New Roman" panose="02020603050405020304" pitchFamily="18" charset="0"/>
+            <a:cs typeface="Times New Roman" panose="02020603050405020304" pitchFamily="18" charset="0"/>
+          </a:endParaRPr>
         </a:p>
       </dgm:t>
     </dgm:pt>
@@ -1826,6 +1962,8 @@
               <a:solidFill>
                 <a:schemeClr val="tx1"/>
               </a:solidFill>
+              <a:latin typeface="Times New Roman" panose="02020603050405020304" pitchFamily="18" charset="0"/>
+              <a:cs typeface="Times New Roman" panose="02020603050405020304" pitchFamily="18" charset="0"/>
             </a:rPr>
             <a:t>Stepped Rotor</a:t>
           </a:r>
@@ -1833,6 +1971,8 @@
             <a:solidFill>
               <a:schemeClr val="tx1"/>
             </a:solidFill>
+            <a:latin typeface="Times New Roman" panose="02020603050405020304" pitchFamily="18" charset="0"/>
+            <a:cs typeface="Times New Roman" panose="02020603050405020304" pitchFamily="18" charset="0"/>
           </a:endParaRPr>
         </a:p>
       </dgm:t>
@@ -1855,6 +1995,8 @@
             <a:solidFill>
               <a:schemeClr val="tx1"/>
             </a:solidFill>
+            <a:latin typeface="Times New Roman" panose="02020603050405020304" pitchFamily="18" charset="0"/>
+            <a:cs typeface="Times New Roman" panose="02020603050405020304" pitchFamily="18" charset="0"/>
           </a:endParaRPr>
         </a:p>
       </dgm:t>
@@ -1866,7 +2008,10 @@
         <a:bodyPr/>
         <a:lstStyle/>
         <a:p>
-          <a:endParaRPr lang="en-GB"/>
+          <a:endParaRPr lang="en-GB">
+            <a:latin typeface="Times New Roman" panose="02020603050405020304" pitchFamily="18" charset="0"/>
+            <a:cs typeface="Times New Roman" panose="02020603050405020304" pitchFamily="18" charset="0"/>
+          </a:endParaRPr>
         </a:p>
       </dgm:t>
     </dgm:pt>
@@ -1889,6 +2034,8 @@
               <a:solidFill>
                 <a:schemeClr val="tx1"/>
               </a:solidFill>
+              <a:latin typeface="Times New Roman" panose="02020603050405020304" pitchFamily="18" charset="0"/>
+              <a:cs typeface="Times New Roman" panose="02020603050405020304" pitchFamily="18" charset="0"/>
             </a:rPr>
             <a:t>Tooth</a:t>
           </a:r>
@@ -1896,6 +2043,8 @@
             <a:solidFill>
               <a:schemeClr val="tx1"/>
             </a:solidFill>
+            <a:latin typeface="Times New Roman" panose="02020603050405020304" pitchFamily="18" charset="0"/>
+            <a:cs typeface="Times New Roman" panose="02020603050405020304" pitchFamily="18" charset="0"/>
           </a:endParaRPr>
         </a:p>
       </dgm:t>
@@ -1918,6 +2067,8 @@
             <a:solidFill>
               <a:schemeClr val="tx1"/>
             </a:solidFill>
+            <a:latin typeface="Times New Roman" panose="02020603050405020304" pitchFamily="18" charset="0"/>
+            <a:cs typeface="Times New Roman" panose="02020603050405020304" pitchFamily="18" charset="0"/>
           </a:endParaRPr>
         </a:p>
       </dgm:t>
@@ -1929,7 +2080,10 @@
         <a:bodyPr/>
         <a:lstStyle/>
         <a:p>
-          <a:endParaRPr lang="en-GB"/>
+          <a:endParaRPr lang="en-GB">
+            <a:latin typeface="Times New Roman" panose="02020603050405020304" pitchFamily="18" charset="0"/>
+            <a:cs typeface="Times New Roman" panose="02020603050405020304" pitchFamily="18" charset="0"/>
+          </a:endParaRPr>
         </a:p>
       </dgm:t>
     </dgm:pt>
@@ -1952,6 +2106,8 @@
               <a:solidFill>
                 <a:schemeClr val="tx1"/>
               </a:solidFill>
+              <a:latin typeface="Times New Roman" panose="02020603050405020304" pitchFamily="18" charset="0"/>
+              <a:cs typeface="Times New Roman" panose="02020603050405020304" pitchFamily="18" charset="0"/>
             </a:rPr>
             <a:t>Zimmem</a:t>
           </a:r>
@@ -1959,6 +2115,8 @@
             <a:solidFill>
               <a:schemeClr val="tx1"/>
             </a:solidFill>
+            <a:latin typeface="Times New Roman" panose="02020603050405020304" pitchFamily="18" charset="0"/>
+            <a:cs typeface="Times New Roman" panose="02020603050405020304" pitchFamily="18" charset="0"/>
           </a:endParaRPr>
         </a:p>
       </dgm:t>
@@ -1981,6 +2139,8 @@
             <a:solidFill>
               <a:schemeClr val="tx1"/>
             </a:solidFill>
+            <a:latin typeface="Times New Roman" panose="02020603050405020304" pitchFamily="18" charset="0"/>
+            <a:cs typeface="Times New Roman" panose="02020603050405020304" pitchFamily="18" charset="0"/>
           </a:endParaRPr>
         </a:p>
       </dgm:t>
@@ -1992,7 +2152,10 @@
         <a:bodyPr/>
         <a:lstStyle/>
         <a:p>
-          <a:endParaRPr lang="en-GB"/>
+          <a:endParaRPr lang="en-GB">
+            <a:latin typeface="Times New Roman" panose="02020603050405020304" pitchFamily="18" charset="0"/>
+            <a:cs typeface="Times New Roman" panose="02020603050405020304" pitchFamily="18" charset="0"/>
+          </a:endParaRPr>
         </a:p>
       </dgm:t>
     </dgm:pt>
@@ -2015,6 +2178,8 @@
               <a:solidFill>
                 <a:schemeClr val="tx1"/>
               </a:solidFill>
+              <a:latin typeface="Times New Roman" panose="02020603050405020304" pitchFamily="18" charset="0"/>
+              <a:cs typeface="Times New Roman" panose="02020603050405020304" pitchFamily="18" charset="0"/>
             </a:rPr>
             <a:t>Centrifugal</a:t>
           </a:r>
@@ -2022,6 +2187,8 @@
             <a:solidFill>
               <a:schemeClr val="tx1"/>
             </a:solidFill>
+            <a:latin typeface="Times New Roman" panose="02020603050405020304" pitchFamily="18" charset="0"/>
+            <a:cs typeface="Times New Roman" panose="02020603050405020304" pitchFamily="18" charset="0"/>
           </a:endParaRPr>
         </a:p>
       </dgm:t>
@@ -2044,6 +2211,8 @@
             <a:solidFill>
               <a:schemeClr val="tx1"/>
             </a:solidFill>
+            <a:latin typeface="Times New Roman" panose="02020603050405020304" pitchFamily="18" charset="0"/>
+            <a:cs typeface="Times New Roman" panose="02020603050405020304" pitchFamily="18" charset="0"/>
           </a:endParaRPr>
         </a:p>
       </dgm:t>
@@ -2055,7 +2224,10 @@
         <a:bodyPr/>
         <a:lstStyle/>
         <a:p>
-          <a:endParaRPr lang="en-GB"/>
+          <a:endParaRPr lang="en-GB">
+            <a:latin typeface="Times New Roman" panose="02020603050405020304" pitchFamily="18" charset="0"/>
+            <a:cs typeface="Times New Roman" panose="02020603050405020304" pitchFamily="18" charset="0"/>
+          </a:endParaRPr>
         </a:p>
       </dgm:t>
     </dgm:pt>
@@ -2078,6 +2250,8 @@
               <a:solidFill>
                 <a:schemeClr val="tx1"/>
               </a:solidFill>
+              <a:latin typeface="Times New Roman" panose="02020603050405020304" pitchFamily="18" charset="0"/>
+              <a:cs typeface="Times New Roman" panose="02020603050405020304" pitchFamily="18" charset="0"/>
             </a:rPr>
             <a:t>Axial</a:t>
           </a:r>
@@ -2085,6 +2259,8 @@
             <a:solidFill>
               <a:schemeClr val="tx1"/>
             </a:solidFill>
+            <a:latin typeface="Times New Roman" panose="02020603050405020304" pitchFamily="18" charset="0"/>
+            <a:cs typeface="Times New Roman" panose="02020603050405020304" pitchFamily="18" charset="0"/>
           </a:endParaRPr>
         </a:p>
       </dgm:t>
@@ -2107,6 +2283,8 @@
             <a:solidFill>
               <a:schemeClr val="tx1"/>
             </a:solidFill>
+            <a:latin typeface="Times New Roman" panose="02020603050405020304" pitchFamily="18" charset="0"/>
+            <a:cs typeface="Times New Roman" panose="02020603050405020304" pitchFamily="18" charset="0"/>
           </a:endParaRPr>
         </a:p>
       </dgm:t>
@@ -2118,7 +2296,10 @@
         <a:bodyPr/>
         <a:lstStyle/>
         <a:p>
-          <a:endParaRPr lang="en-GB"/>
+          <a:endParaRPr lang="en-GB">
+            <a:latin typeface="Times New Roman" panose="02020603050405020304" pitchFamily="18" charset="0"/>
+            <a:cs typeface="Times New Roman" panose="02020603050405020304" pitchFamily="18" charset="0"/>
+          </a:endParaRPr>
         </a:p>
       </dgm:t>
     </dgm:pt>
@@ -2141,6 +2322,8 @@
               <a:solidFill>
                 <a:schemeClr val="tx1"/>
               </a:solidFill>
+              <a:latin typeface="Times New Roman" panose="02020603050405020304" pitchFamily="18" charset="0"/>
+              <a:cs typeface="Times New Roman" panose="02020603050405020304" pitchFamily="18" charset="0"/>
             </a:rPr>
             <a:t>Ejector</a:t>
           </a:r>
@@ -2148,6 +2331,8 @@
             <a:solidFill>
               <a:schemeClr val="tx1"/>
             </a:solidFill>
+            <a:latin typeface="Times New Roman" panose="02020603050405020304" pitchFamily="18" charset="0"/>
+            <a:cs typeface="Times New Roman" panose="02020603050405020304" pitchFamily="18" charset="0"/>
           </a:endParaRPr>
         </a:p>
       </dgm:t>
@@ -2170,6 +2355,8 @@
             <a:solidFill>
               <a:schemeClr val="tx1"/>
             </a:solidFill>
+            <a:latin typeface="Times New Roman" panose="02020603050405020304" pitchFamily="18" charset="0"/>
+            <a:cs typeface="Times New Roman" panose="02020603050405020304" pitchFamily="18" charset="0"/>
           </a:endParaRPr>
         </a:p>
       </dgm:t>
@@ -2181,7 +2368,10 @@
         <a:bodyPr/>
         <a:lstStyle/>
         <a:p>
-          <a:endParaRPr lang="en-GB"/>
+          <a:endParaRPr lang="en-GB">
+            <a:latin typeface="Times New Roman" panose="02020603050405020304" pitchFamily="18" charset="0"/>
+            <a:cs typeface="Times New Roman" panose="02020603050405020304" pitchFamily="18" charset="0"/>
+          </a:endParaRPr>
         </a:p>
       </dgm:t>
     </dgm:pt>
@@ -2205,6 +2395,8 @@
               <a:solidFill>
                 <a:schemeClr val="tx1"/>
               </a:solidFill>
+              <a:latin typeface="Times New Roman" panose="02020603050405020304" pitchFamily="18" charset="0"/>
+              <a:cs typeface="Times New Roman" panose="02020603050405020304" pitchFamily="18" charset="0"/>
             </a:rPr>
             <a:t>Test Site</a:t>
           </a:r>
@@ -2212,6 +2404,8 @@
             <a:solidFill>
               <a:schemeClr val="tx1"/>
             </a:solidFill>
+            <a:latin typeface="Times New Roman" panose="02020603050405020304" pitchFamily="18" charset="0"/>
+            <a:cs typeface="Times New Roman" panose="02020603050405020304" pitchFamily="18" charset="0"/>
           </a:endParaRPr>
         </a:p>
       </dgm:t>
@@ -2234,6 +2428,8 @@
             <a:solidFill>
               <a:schemeClr val="tx1"/>
             </a:solidFill>
+            <a:latin typeface="Times New Roman" panose="02020603050405020304" pitchFamily="18" charset="0"/>
+            <a:cs typeface="Times New Roman" panose="02020603050405020304" pitchFamily="18" charset="0"/>
           </a:endParaRPr>
         </a:p>
       </dgm:t>
@@ -2245,7 +2441,10 @@
         <a:bodyPr/>
         <a:lstStyle/>
         <a:p>
-          <a:endParaRPr lang="en-GB"/>
+          <a:endParaRPr lang="en-GB">
+            <a:latin typeface="Times New Roman" panose="02020603050405020304" pitchFamily="18" charset="0"/>
+            <a:cs typeface="Times New Roman" panose="02020603050405020304" pitchFamily="18" charset="0"/>
+          </a:endParaRPr>
         </a:p>
       </dgm:t>
     </dgm:pt>
@@ -3757,7 +3956,9 @@
     <dgm:cxn modelId="{A75A72C7-2D7A-4E9E-ABF4-7E571F6D9C4B}" type="presParOf" srcId="{2AAC45E6-9CC5-4676-B5BB-8E098DEC7D06}" destId="{571D35CB-5A49-4AF3-8495-787715A13360}" srcOrd="2" destOrd="0" presId="urn:microsoft.com/office/officeart/2005/8/layout/orgChart1"/>
   </dgm:cxnLst>
   <dgm:bg/>
-  <dgm:whole/>
+  <dgm:whole>
+    <a:ln w="9525"/>
+  </dgm:whole>
   <dgm:extLst>
     <a:ext uri="http://schemas.microsoft.com/office/drawing/2008/diagram">
       <dsp:dataModelExt xmlns:dsp="http://schemas.microsoft.com/office/drawing/2008/diagram" relId="rId6" minVer="http://schemas.openxmlformats.org/drawingml/2006/diagram"/>
@@ -4982,6 +5183,8 @@
               <a:solidFill>
                 <a:schemeClr val="tx1"/>
               </a:solidFill>
+              <a:latin typeface="Times New Roman" panose="02020603050405020304" pitchFamily="18" charset="0"/>
+              <a:cs typeface="Times New Roman" panose="02020603050405020304" pitchFamily="18" charset="0"/>
             </a:rPr>
             <a:t>Compressors</a:t>
           </a:r>
@@ -4989,6 +5192,8 @@
             <a:solidFill>
               <a:schemeClr val="tx1"/>
             </a:solidFill>
+            <a:latin typeface="Times New Roman" panose="02020603050405020304" pitchFamily="18" charset="0"/>
+            <a:cs typeface="Times New Roman" panose="02020603050405020304" pitchFamily="18" charset="0"/>
           </a:endParaRPr>
         </a:p>
       </dsp:txBody>
@@ -5056,6 +5261,8 @@
               <a:solidFill>
                 <a:schemeClr val="tx1"/>
               </a:solidFill>
+              <a:latin typeface="Times New Roman" panose="02020603050405020304" pitchFamily="18" charset="0"/>
+              <a:cs typeface="Times New Roman" panose="02020603050405020304" pitchFamily="18" charset="0"/>
             </a:rPr>
             <a:t>Positive Displacement</a:t>
           </a:r>
@@ -5063,6 +5270,8 @@
             <a:solidFill>
               <a:schemeClr val="tx1"/>
             </a:solidFill>
+            <a:latin typeface="Times New Roman" panose="02020603050405020304" pitchFamily="18" charset="0"/>
+            <a:cs typeface="Times New Roman" panose="02020603050405020304" pitchFamily="18" charset="0"/>
           </a:endParaRPr>
         </a:p>
       </dsp:txBody>
@@ -5130,6 +5339,8 @@
               <a:solidFill>
                 <a:schemeClr val="tx1"/>
               </a:solidFill>
+              <a:latin typeface="Times New Roman" panose="02020603050405020304" pitchFamily="18" charset="0"/>
+              <a:cs typeface="Times New Roman" panose="02020603050405020304" pitchFamily="18" charset="0"/>
             </a:rPr>
             <a:t>Reciprocating</a:t>
           </a:r>
@@ -5137,6 +5348,8 @@
             <a:solidFill>
               <a:schemeClr val="tx1"/>
             </a:solidFill>
+            <a:latin typeface="Times New Roman" panose="02020603050405020304" pitchFamily="18" charset="0"/>
+            <a:cs typeface="Times New Roman" panose="02020603050405020304" pitchFamily="18" charset="0"/>
           </a:endParaRPr>
         </a:p>
       </dsp:txBody>
@@ -5204,6 +5417,8 @@
               <a:solidFill>
                 <a:schemeClr val="tx1"/>
               </a:solidFill>
+              <a:latin typeface="Times New Roman" panose="02020603050405020304" pitchFamily="18" charset="0"/>
+              <a:cs typeface="Times New Roman" panose="02020603050405020304" pitchFamily="18" charset="0"/>
             </a:rPr>
             <a:t>Piston</a:t>
           </a:r>
@@ -5211,6 +5426,8 @@
             <a:solidFill>
               <a:schemeClr val="tx1"/>
             </a:solidFill>
+            <a:latin typeface="Times New Roman" panose="02020603050405020304" pitchFamily="18" charset="0"/>
+            <a:cs typeface="Times New Roman" panose="02020603050405020304" pitchFamily="18" charset="0"/>
           </a:endParaRPr>
         </a:p>
       </dsp:txBody>
@@ -5278,6 +5495,8 @@
               <a:solidFill>
                 <a:schemeClr val="tx1"/>
               </a:solidFill>
+              <a:latin typeface="Times New Roman" panose="02020603050405020304" pitchFamily="18" charset="0"/>
+              <a:cs typeface="Times New Roman" panose="02020603050405020304" pitchFamily="18" charset="0"/>
             </a:rPr>
             <a:t>Diaphragm</a:t>
           </a:r>
@@ -5285,6 +5504,8 @@
             <a:solidFill>
               <a:schemeClr val="tx1"/>
             </a:solidFill>
+            <a:latin typeface="Times New Roman" panose="02020603050405020304" pitchFamily="18" charset="0"/>
+            <a:cs typeface="Times New Roman" panose="02020603050405020304" pitchFamily="18" charset="0"/>
           </a:endParaRPr>
         </a:p>
       </dsp:txBody>
@@ -5352,6 +5573,8 @@
               <a:solidFill>
                 <a:schemeClr val="tx1"/>
               </a:solidFill>
+              <a:latin typeface="Times New Roman" panose="02020603050405020304" pitchFamily="18" charset="0"/>
+              <a:cs typeface="Times New Roman" panose="02020603050405020304" pitchFamily="18" charset="0"/>
             </a:rPr>
             <a:t>Rotary</a:t>
           </a:r>
@@ -5359,6 +5582,8 @@
             <a:solidFill>
               <a:schemeClr val="tx1"/>
             </a:solidFill>
+            <a:latin typeface="Times New Roman" panose="02020603050405020304" pitchFamily="18" charset="0"/>
+            <a:cs typeface="Times New Roman" panose="02020603050405020304" pitchFamily="18" charset="0"/>
           </a:endParaRPr>
         </a:p>
       </dsp:txBody>
@@ -5426,6 +5651,8 @@
               <a:solidFill>
                 <a:schemeClr val="tx1"/>
               </a:solidFill>
+              <a:latin typeface="Times New Roman" panose="02020603050405020304" pitchFamily="18" charset="0"/>
+              <a:cs typeface="Times New Roman" panose="02020603050405020304" pitchFamily="18" charset="0"/>
             </a:rPr>
             <a:t>One Shaft</a:t>
           </a:r>
@@ -5433,6 +5660,8 @@
             <a:solidFill>
               <a:schemeClr val="tx1"/>
             </a:solidFill>
+            <a:latin typeface="Times New Roman" panose="02020603050405020304" pitchFamily="18" charset="0"/>
+            <a:cs typeface="Times New Roman" panose="02020603050405020304" pitchFamily="18" charset="0"/>
           </a:endParaRPr>
         </a:p>
       </dsp:txBody>
@@ -5500,6 +5729,8 @@
               <a:solidFill>
                 <a:schemeClr val="tx1"/>
               </a:solidFill>
+              <a:latin typeface="Times New Roman" panose="02020603050405020304" pitchFamily="18" charset="0"/>
+              <a:cs typeface="Times New Roman" panose="02020603050405020304" pitchFamily="18" charset="0"/>
             </a:rPr>
             <a:t>Sliding Vane</a:t>
           </a:r>
@@ -5507,6 +5738,8 @@
             <a:solidFill>
               <a:schemeClr val="tx1"/>
             </a:solidFill>
+            <a:latin typeface="Times New Roman" panose="02020603050405020304" pitchFamily="18" charset="0"/>
+            <a:cs typeface="Times New Roman" panose="02020603050405020304" pitchFamily="18" charset="0"/>
           </a:endParaRPr>
         </a:p>
       </dsp:txBody>
@@ -5574,6 +5807,8 @@
               <a:solidFill>
                 <a:schemeClr val="tx1"/>
               </a:solidFill>
+              <a:latin typeface="Times New Roman" panose="02020603050405020304" pitchFamily="18" charset="0"/>
+              <a:cs typeface="Times New Roman" panose="02020603050405020304" pitchFamily="18" charset="0"/>
             </a:rPr>
             <a:t>Liquid Ring</a:t>
           </a:r>
@@ -5581,6 +5816,8 @@
             <a:solidFill>
               <a:schemeClr val="tx1"/>
             </a:solidFill>
+            <a:latin typeface="Times New Roman" panose="02020603050405020304" pitchFamily="18" charset="0"/>
+            <a:cs typeface="Times New Roman" panose="02020603050405020304" pitchFamily="18" charset="0"/>
           </a:endParaRPr>
         </a:p>
       </dsp:txBody>
@@ -5648,6 +5885,8 @@
               <a:solidFill>
                 <a:schemeClr val="tx1"/>
               </a:solidFill>
+              <a:latin typeface="Times New Roman" panose="02020603050405020304" pitchFamily="18" charset="0"/>
+              <a:cs typeface="Times New Roman" panose="02020603050405020304" pitchFamily="18" charset="0"/>
             </a:rPr>
             <a:t>Scroll</a:t>
           </a:r>
@@ -5655,6 +5894,8 @@
             <a:solidFill>
               <a:schemeClr val="tx1"/>
             </a:solidFill>
+            <a:latin typeface="Times New Roman" panose="02020603050405020304" pitchFamily="18" charset="0"/>
+            <a:cs typeface="Times New Roman" panose="02020603050405020304" pitchFamily="18" charset="0"/>
           </a:endParaRPr>
         </a:p>
       </dsp:txBody>
@@ -5722,6 +5963,8 @@
               <a:solidFill>
                 <a:schemeClr val="tx1"/>
               </a:solidFill>
+              <a:latin typeface="Times New Roman" panose="02020603050405020304" pitchFamily="18" charset="0"/>
+              <a:cs typeface="Times New Roman" panose="02020603050405020304" pitchFamily="18" charset="0"/>
             </a:rPr>
             <a:t>Two Shaft</a:t>
           </a:r>
@@ -5729,6 +5972,8 @@
             <a:solidFill>
               <a:schemeClr val="tx1"/>
             </a:solidFill>
+            <a:latin typeface="Times New Roman" panose="02020603050405020304" pitchFamily="18" charset="0"/>
+            <a:cs typeface="Times New Roman" panose="02020603050405020304" pitchFamily="18" charset="0"/>
           </a:endParaRPr>
         </a:p>
       </dsp:txBody>
@@ -5796,6 +6041,8 @@
               <a:solidFill>
                 <a:schemeClr val="tx1"/>
               </a:solidFill>
+              <a:latin typeface="Times New Roman" panose="02020603050405020304" pitchFamily="18" charset="0"/>
+              <a:cs typeface="Times New Roman" panose="02020603050405020304" pitchFamily="18" charset="0"/>
             </a:rPr>
             <a:t>Roots</a:t>
           </a:r>
@@ -5803,6 +6050,8 @@
             <a:solidFill>
               <a:schemeClr val="tx1"/>
             </a:solidFill>
+            <a:latin typeface="Times New Roman" panose="02020603050405020304" pitchFamily="18" charset="0"/>
+            <a:cs typeface="Times New Roman" panose="02020603050405020304" pitchFamily="18" charset="0"/>
           </a:endParaRPr>
         </a:p>
       </dsp:txBody>
@@ -5870,6 +6119,8 @@
               <a:solidFill>
                 <a:schemeClr val="tx1"/>
               </a:solidFill>
+              <a:latin typeface="Times New Roman" panose="02020603050405020304" pitchFamily="18" charset="0"/>
+              <a:cs typeface="Times New Roman" panose="02020603050405020304" pitchFamily="18" charset="0"/>
             </a:rPr>
             <a:t>Twin Screw</a:t>
           </a:r>
@@ -5877,6 +6128,8 @@
             <a:solidFill>
               <a:schemeClr val="tx1"/>
             </a:solidFill>
+            <a:latin typeface="Times New Roman" panose="02020603050405020304" pitchFamily="18" charset="0"/>
+            <a:cs typeface="Times New Roman" panose="02020603050405020304" pitchFamily="18" charset="0"/>
           </a:endParaRPr>
         </a:p>
       </dsp:txBody>
@@ -5944,6 +6197,8 @@
               <a:solidFill>
                 <a:schemeClr val="tx1"/>
               </a:solidFill>
+              <a:latin typeface="Times New Roman" panose="02020603050405020304" pitchFamily="18" charset="0"/>
+              <a:cs typeface="Times New Roman" panose="02020603050405020304" pitchFamily="18" charset="0"/>
             </a:rPr>
             <a:t>Stepped Rotor</a:t>
           </a:r>
@@ -5951,6 +6206,8 @@
             <a:solidFill>
               <a:schemeClr val="tx1"/>
             </a:solidFill>
+            <a:latin typeface="Times New Roman" panose="02020603050405020304" pitchFamily="18" charset="0"/>
+            <a:cs typeface="Times New Roman" panose="02020603050405020304" pitchFamily="18" charset="0"/>
           </a:endParaRPr>
         </a:p>
       </dsp:txBody>
@@ -6018,6 +6275,8 @@
               <a:solidFill>
                 <a:schemeClr val="tx1"/>
               </a:solidFill>
+              <a:latin typeface="Times New Roman" panose="02020603050405020304" pitchFamily="18" charset="0"/>
+              <a:cs typeface="Times New Roman" panose="02020603050405020304" pitchFamily="18" charset="0"/>
             </a:rPr>
             <a:t>Tooth</a:t>
           </a:r>
@@ -6025,6 +6284,8 @@
             <a:solidFill>
               <a:schemeClr val="tx1"/>
             </a:solidFill>
+            <a:latin typeface="Times New Roman" panose="02020603050405020304" pitchFamily="18" charset="0"/>
+            <a:cs typeface="Times New Roman" panose="02020603050405020304" pitchFamily="18" charset="0"/>
           </a:endParaRPr>
         </a:p>
       </dsp:txBody>
@@ -6092,6 +6353,8 @@
               <a:solidFill>
                 <a:schemeClr val="tx1"/>
               </a:solidFill>
+              <a:latin typeface="Times New Roman" panose="02020603050405020304" pitchFamily="18" charset="0"/>
+              <a:cs typeface="Times New Roman" panose="02020603050405020304" pitchFamily="18" charset="0"/>
             </a:rPr>
             <a:t>Test Site</a:t>
           </a:r>
@@ -6099,6 +6362,8 @@
             <a:solidFill>
               <a:schemeClr val="tx1"/>
             </a:solidFill>
+            <a:latin typeface="Times New Roman" panose="02020603050405020304" pitchFamily="18" charset="0"/>
+            <a:cs typeface="Times New Roman" panose="02020603050405020304" pitchFamily="18" charset="0"/>
           </a:endParaRPr>
         </a:p>
       </dsp:txBody>
@@ -6166,6 +6431,8 @@
               <a:solidFill>
                 <a:schemeClr val="tx1"/>
               </a:solidFill>
+              <a:latin typeface="Times New Roman" panose="02020603050405020304" pitchFamily="18" charset="0"/>
+              <a:cs typeface="Times New Roman" panose="02020603050405020304" pitchFamily="18" charset="0"/>
             </a:rPr>
             <a:t>Three Shaft</a:t>
           </a:r>
@@ -6173,6 +6440,8 @@
             <a:solidFill>
               <a:schemeClr val="tx1"/>
             </a:solidFill>
+            <a:latin typeface="Times New Roman" panose="02020603050405020304" pitchFamily="18" charset="0"/>
+            <a:cs typeface="Times New Roman" panose="02020603050405020304" pitchFamily="18" charset="0"/>
           </a:endParaRPr>
         </a:p>
       </dsp:txBody>
@@ -6240,6 +6509,8 @@
               <a:solidFill>
                 <a:schemeClr val="tx1"/>
               </a:solidFill>
+              <a:latin typeface="Times New Roman" panose="02020603050405020304" pitchFamily="18" charset="0"/>
+              <a:cs typeface="Times New Roman" panose="02020603050405020304" pitchFamily="18" charset="0"/>
             </a:rPr>
             <a:t>Zimmem</a:t>
           </a:r>
@@ -6247,6 +6518,8 @@
             <a:solidFill>
               <a:schemeClr val="tx1"/>
             </a:solidFill>
+            <a:latin typeface="Times New Roman" panose="02020603050405020304" pitchFamily="18" charset="0"/>
+            <a:cs typeface="Times New Roman" panose="02020603050405020304" pitchFamily="18" charset="0"/>
           </a:endParaRPr>
         </a:p>
       </dsp:txBody>
@@ -6314,6 +6587,8 @@
               <a:solidFill>
                 <a:schemeClr val="tx1"/>
               </a:solidFill>
+              <a:latin typeface="Times New Roman" panose="02020603050405020304" pitchFamily="18" charset="0"/>
+              <a:cs typeface="Times New Roman" panose="02020603050405020304" pitchFamily="18" charset="0"/>
             </a:rPr>
             <a:t>Aerodynamic</a:t>
           </a:r>
@@ -6321,6 +6596,8 @@
             <a:solidFill>
               <a:schemeClr val="tx1"/>
             </a:solidFill>
+            <a:latin typeface="Times New Roman" panose="02020603050405020304" pitchFamily="18" charset="0"/>
+            <a:cs typeface="Times New Roman" panose="02020603050405020304" pitchFamily="18" charset="0"/>
           </a:endParaRPr>
         </a:p>
       </dsp:txBody>
@@ -6388,6 +6665,8 @@
               <a:solidFill>
                 <a:schemeClr val="tx1"/>
               </a:solidFill>
+              <a:latin typeface="Times New Roman" panose="02020603050405020304" pitchFamily="18" charset="0"/>
+              <a:cs typeface="Times New Roman" panose="02020603050405020304" pitchFamily="18" charset="0"/>
             </a:rPr>
             <a:t>Centrifugal</a:t>
           </a:r>
@@ -6395,6 +6674,8 @@
             <a:solidFill>
               <a:schemeClr val="tx1"/>
             </a:solidFill>
+            <a:latin typeface="Times New Roman" panose="02020603050405020304" pitchFamily="18" charset="0"/>
+            <a:cs typeface="Times New Roman" panose="02020603050405020304" pitchFamily="18" charset="0"/>
           </a:endParaRPr>
         </a:p>
       </dsp:txBody>
@@ -6462,6 +6743,8 @@
               <a:solidFill>
                 <a:schemeClr val="tx1"/>
               </a:solidFill>
+              <a:latin typeface="Times New Roman" panose="02020603050405020304" pitchFamily="18" charset="0"/>
+              <a:cs typeface="Times New Roman" panose="02020603050405020304" pitchFamily="18" charset="0"/>
             </a:rPr>
             <a:t>Axial</a:t>
           </a:r>
@@ -6469,6 +6752,8 @@
             <a:solidFill>
               <a:schemeClr val="tx1"/>
             </a:solidFill>
+            <a:latin typeface="Times New Roman" panose="02020603050405020304" pitchFamily="18" charset="0"/>
+            <a:cs typeface="Times New Roman" panose="02020603050405020304" pitchFamily="18" charset="0"/>
           </a:endParaRPr>
         </a:p>
       </dsp:txBody>
@@ -6536,6 +6821,8 @@
               <a:solidFill>
                 <a:schemeClr val="tx1"/>
               </a:solidFill>
+              <a:latin typeface="Times New Roman" panose="02020603050405020304" pitchFamily="18" charset="0"/>
+              <a:cs typeface="Times New Roman" panose="02020603050405020304" pitchFamily="18" charset="0"/>
             </a:rPr>
             <a:t>Ejector</a:t>
           </a:r>
@@ -6543,6 +6830,8 @@
             <a:solidFill>
               <a:schemeClr val="tx1"/>
             </a:solidFill>
+            <a:latin typeface="Times New Roman" panose="02020603050405020304" pitchFamily="18" charset="0"/>
+            <a:cs typeface="Times New Roman" panose="02020603050405020304" pitchFamily="18" charset="0"/>
           </a:endParaRPr>
         </a:p>
       </dsp:txBody>
@@ -8866,7 +9155,7 @@
           <a:p>
             <a:fld id="{43C161D5-FD2F-4D30-8939-5605005DEC25}" type="datetimeFigureOut">
               <a:rPr lang="en-GB" smtClean="0"/>
-              <a:t>24/11/2015</a:t>
+              <a:t>01/12/2015</a:t>
             </a:fld>
             <a:endParaRPr lang="en-GB"/>
           </a:p>
@@ -9036,7 +9325,7 @@
           <a:p>
             <a:fld id="{43C161D5-FD2F-4D30-8939-5605005DEC25}" type="datetimeFigureOut">
               <a:rPr lang="en-GB" smtClean="0"/>
-              <a:t>24/11/2015</a:t>
+              <a:t>01/12/2015</a:t>
             </a:fld>
             <a:endParaRPr lang="en-GB"/>
           </a:p>
@@ -9216,7 +9505,7 @@
           <a:p>
             <a:fld id="{43C161D5-FD2F-4D30-8939-5605005DEC25}" type="datetimeFigureOut">
               <a:rPr lang="en-GB" smtClean="0"/>
-              <a:t>24/11/2015</a:t>
+              <a:t>01/12/2015</a:t>
             </a:fld>
             <a:endParaRPr lang="en-GB"/>
           </a:p>
@@ -9386,7 +9675,7 @@
           <a:p>
             <a:fld id="{43C161D5-FD2F-4D30-8939-5605005DEC25}" type="datetimeFigureOut">
               <a:rPr lang="en-GB" smtClean="0"/>
-              <a:t>24/11/2015</a:t>
+              <a:t>01/12/2015</a:t>
             </a:fld>
             <a:endParaRPr lang="en-GB"/>
           </a:p>
@@ -9632,7 +9921,7 @@
           <a:p>
             <a:fld id="{43C161D5-FD2F-4D30-8939-5605005DEC25}" type="datetimeFigureOut">
               <a:rPr lang="en-GB" smtClean="0"/>
-              <a:t>24/11/2015</a:t>
+              <a:t>01/12/2015</a:t>
             </a:fld>
             <a:endParaRPr lang="en-GB"/>
           </a:p>
@@ -9864,7 +10153,7 @@
           <a:p>
             <a:fld id="{43C161D5-FD2F-4D30-8939-5605005DEC25}" type="datetimeFigureOut">
               <a:rPr lang="en-GB" smtClean="0"/>
-              <a:t>24/11/2015</a:t>
+              <a:t>01/12/2015</a:t>
             </a:fld>
             <a:endParaRPr lang="en-GB"/>
           </a:p>
@@ -10231,7 +10520,7 @@
           <a:p>
             <a:fld id="{43C161D5-FD2F-4D30-8939-5605005DEC25}" type="datetimeFigureOut">
               <a:rPr lang="en-GB" smtClean="0"/>
-              <a:t>24/11/2015</a:t>
+              <a:t>01/12/2015</a:t>
             </a:fld>
             <a:endParaRPr lang="en-GB"/>
           </a:p>
@@ -10349,7 +10638,7 @@
           <a:p>
             <a:fld id="{43C161D5-FD2F-4D30-8939-5605005DEC25}" type="datetimeFigureOut">
               <a:rPr lang="en-GB" smtClean="0"/>
-              <a:t>24/11/2015</a:t>
+              <a:t>01/12/2015</a:t>
             </a:fld>
             <a:endParaRPr lang="en-GB"/>
           </a:p>
@@ -10444,7 +10733,7 @@
           <a:p>
             <a:fld id="{43C161D5-FD2F-4D30-8939-5605005DEC25}" type="datetimeFigureOut">
               <a:rPr lang="en-GB" smtClean="0"/>
-              <a:t>24/11/2015</a:t>
+              <a:t>01/12/2015</a:t>
             </a:fld>
             <a:endParaRPr lang="en-GB"/>
           </a:p>
@@ -10721,7 +11010,7 @@
           <a:p>
             <a:fld id="{43C161D5-FD2F-4D30-8939-5605005DEC25}" type="datetimeFigureOut">
               <a:rPr lang="en-GB" smtClean="0"/>
-              <a:t>24/11/2015</a:t>
+              <a:t>01/12/2015</a:t>
             </a:fld>
             <a:endParaRPr lang="en-GB"/>
           </a:p>
@@ -10978,7 +11267,7 @@
           <a:p>
             <a:fld id="{43C161D5-FD2F-4D30-8939-5605005DEC25}" type="datetimeFigureOut">
               <a:rPr lang="en-GB" smtClean="0"/>
-              <a:t>24/11/2015</a:t>
+              <a:t>01/12/2015</a:t>
             </a:fld>
             <a:endParaRPr lang="en-GB"/>
           </a:p>
@@ -11191,7 +11480,7 @@
           <a:p>
             <a:fld id="{43C161D5-FD2F-4D30-8939-5605005DEC25}" type="datetimeFigureOut">
               <a:rPr lang="en-GB" smtClean="0"/>
-              <a:t>24/11/2015</a:t>
+              <a:t>01/12/2015</a:t>
             </a:fld>
             <a:endParaRPr lang="en-GB"/>
           </a:p>
@@ -11603,7 +11892,7 @@
           <p:nvPr>
             <p:extLst>
               <p:ext uri="{D42A27DB-BD31-4B8C-83A1-F6EECF244321}">
-                <p14:modId xmlns:p14="http://schemas.microsoft.com/office/powerpoint/2010/main" val="132759183"/>
+                <p14:modId xmlns:p14="http://schemas.microsoft.com/office/powerpoint/2010/main" val="573514781"/>
               </p:ext>
             </p:extLst>
           </p:nvPr>

</xml_diff>